<commit_message>
Poster update. Still need screenshots/group photo
</commit_message>
<xml_diff>
--- a/Group49_Poster.pptx
+++ b/Group49_Poster.pptx
@@ -255,7 +255,7 @@
             <a:fld id="{9CF59EBC-EC05-6B4D-B166-DDFA6A1EDCB6}" type="datetimeFigureOut">
               <a:rPr lang="en-US" smtClean="0"/>
               <a:pPr/>
-              <a:t>3/19/2019</a:t>
+              <a:t>4/12/2019</a:t>
             </a:fld>
             <a:endParaRPr lang="en-US" dirty="0"/>
           </a:p>
@@ -1832,7 +1832,7 @@
       </p:grpSpPr>
       <p:sp>
         <p:nvSpPr>
-          <p:cNvPr id="6" name="Text Placeholder 16"/>
+          <p:cNvPr id="7" name="Text Placeholder 18"/>
           <p:cNvSpPr txBox="1">
             <a:spLocks/>
           </p:cNvSpPr>
@@ -1840,8 +1840,8 @@
         </p:nvSpPr>
         <p:spPr>
           <a:xfrm>
-            <a:off x="12292014" y="23095171"/>
-            <a:ext cx="9418320" cy="677108"/>
+            <a:off x="1964268" y="14018159"/>
+            <a:ext cx="8158689" cy="6376169"/>
           </a:xfrm>
           <a:prstGeom prst="rect">
             <a:avLst/>
@@ -1854,204 +1854,6 @@
           <a:lstStyle>
             <a:lvl1pPr marL="0" indent="0" algn="l" defTabSz="4389120" rtl="0" eaLnBrk="1" latinLnBrk="0" hangingPunct="1">
               <a:lnSpc>
-                <a:spcPct val="90000"/>
-              </a:lnSpc>
-              <a:spcBef>
-                <a:spcPts val="4800"/>
-              </a:spcBef>
-              <a:buFontTx/>
-              <a:buNone/>
-              <a:defRPr sz="4800" kern="1200" cap="all" baseline="0">
-                <a:solidFill>
-                  <a:schemeClr val="tx1"/>
-                </a:solidFill>
-                <a:latin typeface="KievitPro-Medium" charset="0"/>
-                <a:ea typeface="+mn-ea"/>
-                <a:cs typeface="+mn-cs"/>
-              </a:defRPr>
-            </a:lvl1pPr>
-            <a:lvl2pPr marL="2194560" indent="0" algn="l" defTabSz="4389120" rtl="0" eaLnBrk="1" latinLnBrk="0" hangingPunct="1">
-              <a:lnSpc>
-                <a:spcPct val="90000"/>
-              </a:lnSpc>
-              <a:spcBef>
-                <a:spcPts val="2400"/>
-              </a:spcBef>
-              <a:buFontTx/>
-              <a:buNone/>
-              <a:defRPr sz="4800" kern="1200" cap="all" baseline="0">
-                <a:solidFill>
-                  <a:schemeClr val="tx1"/>
-                </a:solidFill>
-                <a:latin typeface="KievitPro-Medium" charset="0"/>
-                <a:ea typeface="+mn-ea"/>
-                <a:cs typeface="+mn-cs"/>
-              </a:defRPr>
-            </a:lvl2pPr>
-            <a:lvl3pPr marL="4389120" indent="0" algn="l" defTabSz="4389120" rtl="0" eaLnBrk="1" latinLnBrk="0" hangingPunct="1">
-              <a:lnSpc>
-                <a:spcPct val="90000"/>
-              </a:lnSpc>
-              <a:spcBef>
-                <a:spcPts val="2400"/>
-              </a:spcBef>
-              <a:buFontTx/>
-              <a:buNone/>
-              <a:defRPr sz="4800" kern="1200" cap="all" baseline="0">
-                <a:solidFill>
-                  <a:schemeClr val="tx1"/>
-                </a:solidFill>
-                <a:latin typeface="KievitPro-Medium" charset="0"/>
-                <a:ea typeface="+mn-ea"/>
-                <a:cs typeface="+mn-cs"/>
-              </a:defRPr>
-            </a:lvl3pPr>
-            <a:lvl4pPr marL="6583680" indent="0" algn="l" defTabSz="4389120" rtl="0" eaLnBrk="1" latinLnBrk="0" hangingPunct="1">
-              <a:lnSpc>
-                <a:spcPct val="90000"/>
-              </a:lnSpc>
-              <a:spcBef>
-                <a:spcPts val="2400"/>
-              </a:spcBef>
-              <a:buFontTx/>
-              <a:buNone/>
-              <a:defRPr sz="4800" kern="1200" cap="all" baseline="0">
-                <a:solidFill>
-                  <a:schemeClr val="tx1"/>
-                </a:solidFill>
-                <a:latin typeface="KievitPro-Medium" charset="0"/>
-                <a:ea typeface="+mn-ea"/>
-                <a:cs typeface="+mn-cs"/>
-              </a:defRPr>
-            </a:lvl4pPr>
-            <a:lvl5pPr marL="8778240" indent="0" algn="l" defTabSz="4389120" rtl="0" eaLnBrk="1" latinLnBrk="0" hangingPunct="1">
-              <a:lnSpc>
-                <a:spcPct val="90000"/>
-              </a:lnSpc>
-              <a:spcBef>
-                <a:spcPts val="2400"/>
-              </a:spcBef>
-              <a:buFontTx/>
-              <a:buNone/>
-              <a:defRPr sz="4800" kern="1200" cap="all" baseline="0">
-                <a:solidFill>
-                  <a:schemeClr val="tx1"/>
-                </a:solidFill>
-                <a:latin typeface="KievitPro-Medium" charset="0"/>
-                <a:ea typeface="+mn-ea"/>
-                <a:cs typeface="+mn-cs"/>
-              </a:defRPr>
-            </a:lvl5pPr>
-            <a:lvl6pPr marL="12070080" indent="-1097280" algn="l" defTabSz="4389120" rtl="0" eaLnBrk="1" latinLnBrk="0" hangingPunct="1">
-              <a:lnSpc>
-                <a:spcPct val="90000"/>
-              </a:lnSpc>
-              <a:spcBef>
-                <a:spcPts val="2400"/>
-              </a:spcBef>
-              <a:buFont typeface="Arial" panose="020B0604020202020204" pitchFamily="34" charset="0"/>
-              <a:buChar char="•"/>
-              <a:defRPr sz="8640" kern="1200">
-                <a:solidFill>
-                  <a:schemeClr val="tx1"/>
-                </a:solidFill>
-                <a:latin typeface="+mn-lt"/>
-                <a:ea typeface="+mn-ea"/>
-                <a:cs typeface="+mn-cs"/>
-              </a:defRPr>
-            </a:lvl6pPr>
-            <a:lvl7pPr marL="14264640" indent="-1097280" algn="l" defTabSz="4389120" rtl="0" eaLnBrk="1" latinLnBrk="0" hangingPunct="1">
-              <a:lnSpc>
-                <a:spcPct val="90000"/>
-              </a:lnSpc>
-              <a:spcBef>
-                <a:spcPts val="2400"/>
-              </a:spcBef>
-              <a:buFont typeface="Arial" panose="020B0604020202020204" pitchFamily="34" charset="0"/>
-              <a:buChar char="•"/>
-              <a:defRPr sz="8640" kern="1200">
-                <a:solidFill>
-                  <a:schemeClr val="tx1"/>
-                </a:solidFill>
-                <a:latin typeface="+mn-lt"/>
-                <a:ea typeface="+mn-ea"/>
-                <a:cs typeface="+mn-cs"/>
-              </a:defRPr>
-            </a:lvl7pPr>
-            <a:lvl8pPr marL="16459200" indent="-1097280" algn="l" defTabSz="4389120" rtl="0" eaLnBrk="1" latinLnBrk="0" hangingPunct="1">
-              <a:lnSpc>
-                <a:spcPct val="90000"/>
-              </a:lnSpc>
-              <a:spcBef>
-                <a:spcPts val="2400"/>
-              </a:spcBef>
-              <a:buFont typeface="Arial" panose="020B0604020202020204" pitchFamily="34" charset="0"/>
-              <a:buChar char="•"/>
-              <a:defRPr sz="8640" kern="1200">
-                <a:solidFill>
-                  <a:schemeClr val="tx1"/>
-                </a:solidFill>
-                <a:latin typeface="+mn-lt"/>
-                <a:ea typeface="+mn-ea"/>
-                <a:cs typeface="+mn-cs"/>
-              </a:defRPr>
-            </a:lvl8pPr>
-            <a:lvl9pPr marL="18653760" indent="-1097280" algn="l" defTabSz="4389120" rtl="0" eaLnBrk="1" latinLnBrk="0" hangingPunct="1">
-              <a:lnSpc>
-                <a:spcPct val="90000"/>
-              </a:lnSpc>
-              <a:spcBef>
-                <a:spcPts val="2400"/>
-              </a:spcBef>
-              <a:buFont typeface="Arial" panose="020B0604020202020204" pitchFamily="34" charset="0"/>
-              <a:buChar char="•"/>
-              <a:defRPr sz="8640" kern="1200">
-                <a:solidFill>
-                  <a:schemeClr val="tx1"/>
-                </a:solidFill>
-                <a:latin typeface="+mn-lt"/>
-                <a:ea typeface="+mn-ea"/>
-                <a:cs typeface="+mn-cs"/>
-              </a:defRPr>
-            </a:lvl9pPr>
-          </a:lstStyle>
-          <a:p>
-            <a:r>
-              <a:rPr lang="en-US" dirty="0">
-                <a:solidFill>
-                  <a:srgbClr val="E05529"/>
-                </a:solidFill>
-                <a:latin typeface="Verdana Regular" charset="0"/>
-              </a:rPr>
-              <a:t>OMSI</a:t>
-            </a:r>
-          </a:p>
-        </p:txBody>
-      </p:sp>
-      <p:sp>
-        <p:nvSpPr>
-          <p:cNvPr id="7" name="Text Placeholder 18"/>
-          <p:cNvSpPr txBox="1">
-            <a:spLocks/>
-          </p:cNvSpPr>
-          <p:nvPr/>
-        </p:nvSpPr>
-        <p:spPr>
-          <a:xfrm>
-            <a:off x="12292014" y="24061092"/>
-            <a:ext cx="9418320" cy="3889591"/>
-          </a:xfrm>
-          <a:prstGeom prst="rect">
-            <a:avLst/>
-          </a:prstGeom>
-        </p:spPr>
-        <p:txBody>
-          <a:bodyPr wrap="square" lIns="0" tIns="0" rIns="0" bIns="0">
-            <a:spAutoFit/>
-          </a:bodyPr>
-          <a:lstStyle>
-            <a:lvl1pPr marL="0" indent="0" algn="l" defTabSz="4389120" rtl="0" eaLnBrk="1" latinLnBrk="0" hangingPunct="1">
-              <a:lnSpc>
                 <a:spcPts val="3360"/>
               </a:lnSpc>
               <a:spcBef>
@@ -2219,25 +2021,40 @@
           </a:lstStyle>
           <a:p>
             <a:pPr>
+              <a:lnSpc>
+                <a:spcPct val="150000"/>
+              </a:lnSpc>
               <a:spcAft>
                 <a:spcPts val="2600"/>
               </a:spcAft>
             </a:pPr>
             <a:r>
               <a:rPr lang="en-US" dirty="0">
-                <a:latin typeface="Verdana Regular" charset="0"/>
+                <a:solidFill>
+                  <a:schemeClr val="bg1"/>
+                </a:solidFill>
+                <a:latin typeface="Verdana" panose="020B0604030504040204" pitchFamily="34" charset="0"/>
+                <a:ea typeface="Verdana" panose="020B0604030504040204" pitchFamily="34" charset="0"/>
               </a:rPr>
               <a:t>The Oregon Museum of Science and Industry (OMSI) requested this animation of the Apollo 11 Mission so that it could be displayed in the Harry C. Kendall Planetarium this Summer to commemorate the 50</a:t>
             </a:r>
             <a:r>
               <a:rPr lang="en-US" baseline="30000" dirty="0">
-                <a:latin typeface="Verdana Regular" charset="0"/>
+                <a:solidFill>
+                  <a:schemeClr val="bg1"/>
+                </a:solidFill>
+                <a:latin typeface="Verdana" panose="020B0604030504040204" pitchFamily="34" charset="0"/>
+                <a:ea typeface="Verdana" panose="020B0604030504040204" pitchFamily="34" charset="0"/>
               </a:rPr>
               <a:t>th</a:t>
             </a:r>
             <a:r>
               <a:rPr lang="en-US" dirty="0">
-                <a:latin typeface="Verdana Regular" charset="0"/>
+                <a:solidFill>
+                  <a:schemeClr val="bg1"/>
+                </a:solidFill>
+                <a:latin typeface="Verdana" panose="020B0604030504040204" pitchFamily="34" charset="0"/>
+                <a:ea typeface="Verdana" panose="020B0604030504040204" pitchFamily="34" charset="0"/>
               </a:rPr>
               <a:t> anniversary of the mission. With direction from Jim Todd, the Director of Space Science Education, our team created the animation with the goal to educate and inspire viewers of all ages and backgrounds. </a:t>
             </a:r>
@@ -2254,7 +2071,7 @@
         </p:nvSpPr>
         <p:spPr>
           <a:xfrm>
-            <a:off x="33934401" y="20351138"/>
+            <a:off x="33623938" y="24549981"/>
             <a:ext cx="7908923" cy="677108"/>
           </a:xfrm>
           <a:prstGeom prst="rect">
@@ -2470,8 +2287,8 @@
         </p:nvSpPr>
         <p:spPr>
           <a:xfrm>
-            <a:off x="33934401" y="21279492"/>
-            <a:ext cx="9084485" cy="4223016"/>
+            <a:off x="33823963" y="25638137"/>
+            <a:ext cx="9084485" cy="7280263"/>
           </a:xfrm>
           <a:prstGeom prst="rect">
             <a:avLst/>
@@ -2650,6 +2467,142 @@
             </a:lvl9pPr>
           </a:lstStyle>
           <a:p>
+            <a:pPr marL="0" indent="0">
+              <a:lnSpc>
+                <a:spcPct val="100000"/>
+              </a:lnSpc>
+              <a:spcAft>
+                <a:spcPts val="2600"/>
+              </a:spcAft>
+              <a:buNone/>
+            </a:pPr>
+            <a:r>
+              <a:rPr lang="en-US" dirty="0">
+                <a:latin typeface="Verdana Regular" charset="0"/>
+              </a:rPr>
+              <a:t>Student Team:</a:t>
+            </a:r>
+          </a:p>
+          <a:p>
+            <a:pPr marL="0" indent="0">
+              <a:lnSpc>
+                <a:spcPct val="100000"/>
+              </a:lnSpc>
+              <a:spcAft>
+                <a:spcPts val="2600"/>
+              </a:spcAft>
+              <a:buNone/>
+            </a:pPr>
+            <a:r>
+              <a:rPr lang="en-US" dirty="0">
+                <a:latin typeface="Verdana Regular" charset="0"/>
+              </a:rPr>
+              <a:t>  Dean Akin – akind@oregonstate.edu</a:t>
+            </a:r>
+          </a:p>
+          <a:p>
+            <a:pPr marL="0" indent="0">
+              <a:lnSpc>
+                <a:spcPct val="100000"/>
+              </a:lnSpc>
+              <a:spcAft>
+                <a:spcPts val="2600"/>
+              </a:spcAft>
+              <a:buNone/>
+            </a:pPr>
+            <a:r>
+              <a:rPr lang="en-US" dirty="0">
+                <a:latin typeface="Verdana Regular" charset="0"/>
+              </a:rPr>
+              <a:t>  Jonathan Ropp – roppjo@oregonstate.edu</a:t>
+            </a:r>
+          </a:p>
+          <a:p>
+            <a:pPr marL="0" indent="0">
+              <a:lnSpc>
+                <a:spcPct val="100000"/>
+              </a:lnSpc>
+              <a:spcAft>
+                <a:spcPts val="2600"/>
+              </a:spcAft>
+              <a:buNone/>
+            </a:pPr>
+            <a:r>
+              <a:rPr lang="en-US" dirty="0">
+                <a:latin typeface="Verdana Regular" charset="0"/>
+              </a:rPr>
+              <a:t>  Shannon Sandy – sandys@oregonstate.edu </a:t>
+            </a:r>
+          </a:p>
+          <a:p>
+            <a:pPr marL="0" indent="0">
+              <a:lnSpc>
+                <a:spcPct val="100000"/>
+              </a:lnSpc>
+              <a:spcAft>
+                <a:spcPts val="2600"/>
+              </a:spcAft>
+              <a:buNone/>
+            </a:pPr>
+            <a:r>
+              <a:rPr lang="en-US" dirty="0">
+                <a:latin typeface="Verdana Regular" charset="0"/>
+              </a:rPr>
+              <a:t>Client:</a:t>
+            </a:r>
+          </a:p>
+          <a:p>
+            <a:pPr marL="0" indent="0">
+              <a:lnSpc>
+                <a:spcPct val="100000"/>
+              </a:lnSpc>
+              <a:spcAft>
+                <a:spcPts val="2600"/>
+              </a:spcAft>
+              <a:buNone/>
+            </a:pPr>
+            <a:r>
+              <a:rPr lang="en-US" dirty="0">
+                <a:latin typeface="Verdana Regular"/>
+              </a:rPr>
+              <a:t>  Jim Todd – jtodd@omsi.edu</a:t>
+            </a:r>
+          </a:p>
+          <a:p>
+            <a:pPr marL="0" indent="0">
+              <a:lnSpc>
+                <a:spcPct val="100000"/>
+              </a:lnSpc>
+              <a:spcAft>
+                <a:spcPts val="2600"/>
+              </a:spcAft>
+              <a:buNone/>
+            </a:pPr>
+            <a:r>
+              <a:rPr lang="en-US" dirty="0">
+                <a:latin typeface="Verdana Regular"/>
+              </a:rPr>
+              <a:t>OSU Mentor:</a:t>
+            </a:r>
+          </a:p>
+          <a:p>
+            <a:pPr marL="0" indent="0">
+              <a:lnSpc>
+                <a:spcPct val="100000"/>
+              </a:lnSpc>
+              <a:spcAft>
+                <a:spcPts val="2600"/>
+              </a:spcAft>
+              <a:buNone/>
+            </a:pPr>
+            <a:r>
+              <a:rPr lang="en-US" dirty="0">
+                <a:latin typeface="Verdana Regular" charset="0"/>
+              </a:rPr>
+              <a:t>  Professor Mike Bailey – mjb@oregonstate.edu </a:t>
+            </a:r>
+          </a:p>
+          <a:p>
             <a:pPr>
               <a:lnSpc>
                 <a:spcPct val="100000"/>
@@ -2658,76 +2611,9 @@
                 <a:spcPts val="2600"/>
               </a:spcAft>
             </a:pPr>
-            <a:r>
-              <a:rPr lang="en-US" dirty="0">
-                <a:latin typeface="Verdana Regular" charset="0"/>
-              </a:rPr>
-              <a:t>Dean Akin – akind@oregonstate.edu</a:t>
-            </a:r>
-          </a:p>
-          <a:p>
-            <a:pPr>
-              <a:lnSpc>
-                <a:spcPct val="100000"/>
-              </a:lnSpc>
-              <a:spcAft>
-                <a:spcPts val="2600"/>
-              </a:spcAft>
-            </a:pPr>
-            <a:r>
-              <a:rPr lang="en-US" dirty="0">
-                <a:latin typeface="Verdana Regular" charset="0"/>
-              </a:rPr>
-              <a:t>Jonathan Ropp – roppjo@oregonstate.edu</a:t>
-            </a:r>
-          </a:p>
-          <a:p>
-            <a:pPr>
-              <a:lnSpc>
-                <a:spcPct val="100000"/>
-              </a:lnSpc>
-              <a:spcAft>
-                <a:spcPts val="2600"/>
-              </a:spcAft>
-            </a:pPr>
-            <a:r>
-              <a:rPr lang="en-US" dirty="0">
-                <a:latin typeface="Verdana Regular" charset="0"/>
-              </a:rPr>
-              <a:t>Shannon Sandy – sandys@oregonstate.edu </a:t>
-            </a:r>
-          </a:p>
-          <a:p>
-            <a:pPr>
-              <a:lnSpc>
-                <a:spcPct val="100000"/>
-              </a:lnSpc>
-              <a:spcAft>
-                <a:spcPts val="2600"/>
-              </a:spcAft>
-            </a:pPr>
-            <a:r>
-              <a:rPr lang="en-US" dirty="0">
-                <a:latin typeface="Verdana Regular" charset="0"/>
-              </a:rPr>
-              <a:t>Mike Bailey – mjb@oregonstate.edu </a:t>
-            </a:r>
-          </a:p>
-          <a:p>
-            <a:pPr>
-              <a:lnSpc>
-                <a:spcPct val="100000"/>
-              </a:lnSpc>
-              <a:spcAft>
-                <a:spcPts val="2600"/>
-              </a:spcAft>
-            </a:pPr>
-            <a:r>
-              <a:rPr lang="en-US" dirty="0">
-                <a:latin typeface="Verdana Regular"/>
-              </a:rPr>
-              <a:t>Jim Todd – jtodd@omsi.edu</a:t>
-            </a:r>
+            <a:endParaRPr lang="en-US" dirty="0">
+              <a:latin typeface="Verdana Regular"/>
+            </a:endParaRPr>
           </a:p>
           <a:p>
             <a:pPr>
@@ -2751,7 +2637,7 @@
         </p:nvSpPr>
         <p:spPr>
           <a:xfrm>
-            <a:off x="1931989" y="5503233"/>
+            <a:off x="1931989" y="3661797"/>
             <a:ext cx="8158690" cy="677108"/>
           </a:xfrm>
           <a:prstGeom prst="rect">
@@ -2949,7 +2835,7 @@
         </p:nvSpPr>
         <p:spPr>
           <a:xfrm>
-            <a:off x="1964266" y="6422030"/>
+            <a:off x="1923079" y="4703565"/>
             <a:ext cx="8126412" cy="8608832"/>
           </a:xfrm>
           <a:prstGeom prst="rect">
@@ -3349,7 +3235,7 @@
         <p:spPr>
           <a:xfrm>
             <a:off x="12292012" y="5503233"/>
-            <a:ext cx="19544199" cy="3661549"/>
+            <a:ext cx="19544199" cy="1526217"/>
           </a:xfrm>
           <a:prstGeom prst="rect">
             <a:avLst/>
@@ -3529,23 +3415,7 @@
                 <a:ea typeface="Georgia" charset="0"/>
                 <a:cs typeface="Georgia" charset="0"/>
               </a:rPr>
-              <a:t>This Summer marks the 50</a:t>
-            </a:r>
-            <a:r>
-              <a:rPr lang="en-US" baseline="30000" dirty="0">
-                <a:latin typeface="Georgia" charset="0"/>
-                <a:ea typeface="Georgia" charset="0"/>
-                <a:cs typeface="Georgia" charset="0"/>
-              </a:rPr>
-              <a:t>th</a:t>
-            </a:r>
-            <a:r>
-              <a:rPr lang="en-US" dirty="0">
-                <a:latin typeface="Georgia" charset="0"/>
-                <a:ea typeface="Georgia" charset="0"/>
-                <a:cs typeface="Georgia" charset="0"/>
-              </a:rPr>
-              <a:t> anniversary of the Apollo 11 space mission when Neil Armstrong took the first steps on the Moon </a:t>
+              <a:t>Experiencing the first steps on the Moon</a:t>
             </a:r>
           </a:p>
         </p:txBody>
@@ -4184,7 +4054,7 @@
                 <a:ea typeface="Impact" charset="0"/>
                 <a:cs typeface="Impact" charset="0"/>
               </a:rPr>
-              <a:t>CS-49</a:t>
+              <a:t>CS49</a:t>
             </a:r>
             <a:endParaRPr lang="en-US" sz="5400" spc="520" baseline="0" dirty="0">
               <a:latin typeface="Impact" charset="0"/>
@@ -4225,8 +4095,8 @@
         </p:blipFill>
         <p:spPr bwMode="auto">
           <a:xfrm>
-            <a:off x="12304713" y="9976466"/>
-            <a:ext cx="19243675" cy="12045642"/>
+            <a:off x="12246292" y="7797754"/>
+            <a:ext cx="9937490" cy="6220405"/>
           </a:xfrm>
           <a:prstGeom prst="rect">
             <a:avLst/>
@@ -4274,8 +4144,8 @@
         </p:blipFill>
         <p:spPr bwMode="auto">
           <a:xfrm>
-            <a:off x="24619268" y="23095171"/>
-            <a:ext cx="6929120" cy="7888276"/>
+            <a:off x="35343718" y="17945099"/>
+            <a:ext cx="5372332" cy="6115991"/>
           </a:xfrm>
           <a:prstGeom prst="rect">
             <a:avLst/>
@@ -4321,8 +4191,8 @@
         </p:blipFill>
         <p:spPr bwMode="auto">
           <a:xfrm>
-            <a:off x="731521" y="21952991"/>
-            <a:ext cx="10274474" cy="4216202"/>
+            <a:off x="19109982" y="15900805"/>
+            <a:ext cx="12958934" cy="5700916"/>
           </a:xfrm>
           <a:prstGeom prst="rect">
             <a:avLst/>
@@ -4353,8 +4223,8 @@
         </p:nvSpPr>
         <p:spPr>
           <a:xfrm>
-            <a:off x="12926290" y="10390909"/>
-            <a:ext cx="6899564" cy="1938992"/>
+            <a:off x="22453007" y="8912096"/>
+            <a:ext cx="9583982" cy="3600986"/>
           </a:xfrm>
           <a:prstGeom prst="rect">
             <a:avLst/>
@@ -4369,12 +4239,15 @@
           <a:p>
             <a:pPr algn="ctr"/>
             <a:r>
-              <a:rPr lang="en-US" sz="6000" dirty="0">
-                <a:solidFill>
-                  <a:schemeClr val="bg1"/>
-                </a:solidFill>
-              </a:rPr>
-              <a:t>Will be screenshot of animation</a:t>
+              <a:rPr lang="en-US" sz="6600" b="1" dirty="0"/>
+              <a:t>Tranquility Base</a:t>
+            </a:r>
+          </a:p>
+          <a:p>
+            <a:pPr algn="ctr"/>
+            <a:r>
+              <a:rPr lang="en-US" sz="5400" dirty="0"/>
+              <a:t>Many different objects used from many different sources. Accurate scaling and positioning was key.</a:t>
             </a:r>
           </a:p>
         </p:txBody>
@@ -4393,8 +4266,8 @@
         </p:nvSpPr>
         <p:spPr>
           <a:xfrm flipH="1">
-            <a:off x="731519" y="24905491"/>
-            <a:ext cx="10274475" cy="1107996"/>
+            <a:off x="11467718" y="16786442"/>
+            <a:ext cx="7454150" cy="4431983"/>
           </a:xfrm>
           <a:prstGeom prst="rect">
             <a:avLst/>
@@ -4409,382 +4282,16 @@
           <a:p>
             <a:pPr algn="ctr"/>
             <a:r>
-              <a:rPr lang="en-US" sz="6600" dirty="0">
-                <a:solidFill>
-                  <a:schemeClr val="bg1"/>
-                </a:solidFill>
-              </a:rPr>
-              <a:t>Flight path (From animation)</a:t>
-            </a:r>
-          </a:p>
-        </p:txBody>
-      </p:sp>
-      <p:sp>
-        <p:nvSpPr>
-          <p:cNvPr id="4" name="TextBox 3">
-            <a:extLst>
-              <a:ext uri="{FF2B5EF4-FFF2-40B4-BE49-F238E27FC236}">
-                <a16:creationId xmlns:a16="http://schemas.microsoft.com/office/drawing/2014/main" id="{6B868B03-678F-4ADA-8BBC-B5AEB8A63515}"/>
-              </a:ext>
-            </a:extLst>
-          </p:cNvPr>
-          <p:cNvSpPr txBox="1"/>
-          <p:nvPr/>
-        </p:nvSpPr>
-        <p:spPr>
-          <a:xfrm>
-            <a:off x="24619267" y="22833792"/>
-            <a:ext cx="4675909" cy="3323987"/>
-          </a:xfrm>
-          <a:prstGeom prst="rect">
-            <a:avLst/>
-          </a:prstGeom>
-          <a:noFill/>
-        </p:spPr>
-        <p:txBody>
-          <a:bodyPr wrap="square" rtlCol="0">
-            <a:spAutoFit/>
-          </a:bodyPr>
-          <a:lstStyle/>
+              <a:rPr lang="en-US" sz="6600" b="1" dirty="0"/>
+              <a:t>Apollo 11 Flight Path</a:t>
+            </a:r>
+          </a:p>
           <a:p>
             <a:pPr algn="ctr"/>
             <a:r>
-              <a:rPr lang="en-US" dirty="0">
-                <a:solidFill>
-                  <a:schemeClr val="bg1"/>
-                </a:solidFill>
-              </a:rPr>
-              <a:t>Maybe our team posed like this</a:t>
-            </a:r>
-          </a:p>
-        </p:txBody>
-      </p:sp>
-      <p:sp>
-        <p:nvSpPr>
-          <p:cNvPr id="19" name="Text Placeholder 16">
-            <a:extLst>
-              <a:ext uri="{FF2B5EF4-FFF2-40B4-BE49-F238E27FC236}">
-                <a16:creationId xmlns:a16="http://schemas.microsoft.com/office/drawing/2014/main" id="{B81AD830-FF56-44B5-AA99-4223CD84C5C5}"/>
-              </a:ext>
-            </a:extLst>
-          </p:cNvPr>
-          <p:cNvSpPr txBox="1">
-            <a:spLocks/>
-          </p:cNvSpPr>
-          <p:nvPr/>
-        </p:nvSpPr>
-        <p:spPr>
-          <a:xfrm>
-            <a:off x="33966678" y="25857891"/>
-            <a:ext cx="6929120" cy="677108"/>
-          </a:xfrm>
-          <a:prstGeom prst="rect">
-            <a:avLst/>
-          </a:prstGeom>
-        </p:spPr>
-        <p:txBody>
-          <a:bodyPr wrap="square" lIns="0" tIns="0" rIns="0" bIns="0">
-            <a:spAutoFit/>
-          </a:bodyPr>
-          <a:lstStyle>
-            <a:lvl1pPr marL="0" indent="0" algn="l" defTabSz="4389120" rtl="0" eaLnBrk="1" latinLnBrk="0" hangingPunct="1">
-              <a:lnSpc>
-                <a:spcPct val="90000"/>
-              </a:lnSpc>
-              <a:spcBef>
-                <a:spcPts val="4800"/>
-              </a:spcBef>
-              <a:buFontTx/>
-              <a:buNone/>
-              <a:defRPr sz="4800" kern="1200" cap="all" baseline="0">
-                <a:solidFill>
-                  <a:schemeClr val="tx1"/>
-                </a:solidFill>
-                <a:latin typeface="KievitPro-Medium" charset="0"/>
-                <a:ea typeface="+mn-ea"/>
-                <a:cs typeface="+mn-cs"/>
-              </a:defRPr>
-            </a:lvl1pPr>
-            <a:lvl2pPr marL="2194560" indent="0" algn="l" defTabSz="4389120" rtl="0" eaLnBrk="1" latinLnBrk="0" hangingPunct="1">
-              <a:lnSpc>
-                <a:spcPct val="90000"/>
-              </a:lnSpc>
-              <a:spcBef>
-                <a:spcPts val="2400"/>
-              </a:spcBef>
-              <a:buFontTx/>
-              <a:buNone/>
-              <a:defRPr sz="4800" kern="1200" cap="all" baseline="0">
-                <a:solidFill>
-                  <a:schemeClr val="tx1"/>
-                </a:solidFill>
-                <a:latin typeface="KievitPro-Medium" charset="0"/>
-                <a:ea typeface="+mn-ea"/>
-                <a:cs typeface="+mn-cs"/>
-              </a:defRPr>
-            </a:lvl2pPr>
-            <a:lvl3pPr marL="4389120" indent="0" algn="l" defTabSz="4389120" rtl="0" eaLnBrk="1" latinLnBrk="0" hangingPunct="1">
-              <a:lnSpc>
-                <a:spcPct val="90000"/>
-              </a:lnSpc>
-              <a:spcBef>
-                <a:spcPts val="2400"/>
-              </a:spcBef>
-              <a:buFontTx/>
-              <a:buNone/>
-              <a:defRPr sz="4800" kern="1200" cap="all" baseline="0">
-                <a:solidFill>
-                  <a:schemeClr val="tx1"/>
-                </a:solidFill>
-                <a:latin typeface="KievitPro-Medium" charset="0"/>
-                <a:ea typeface="+mn-ea"/>
-                <a:cs typeface="+mn-cs"/>
-              </a:defRPr>
-            </a:lvl3pPr>
-            <a:lvl4pPr marL="6583680" indent="0" algn="l" defTabSz="4389120" rtl="0" eaLnBrk="1" latinLnBrk="0" hangingPunct="1">
-              <a:lnSpc>
-                <a:spcPct val="90000"/>
-              </a:lnSpc>
-              <a:spcBef>
-                <a:spcPts val="2400"/>
-              </a:spcBef>
-              <a:buFontTx/>
-              <a:buNone/>
-              <a:defRPr sz="4800" kern="1200" cap="all" baseline="0">
-                <a:solidFill>
-                  <a:schemeClr val="tx1"/>
-                </a:solidFill>
-                <a:latin typeface="KievitPro-Medium" charset="0"/>
-                <a:ea typeface="+mn-ea"/>
-                <a:cs typeface="+mn-cs"/>
-              </a:defRPr>
-            </a:lvl4pPr>
-            <a:lvl5pPr marL="8778240" indent="0" algn="l" defTabSz="4389120" rtl="0" eaLnBrk="1" latinLnBrk="0" hangingPunct="1">
-              <a:lnSpc>
-                <a:spcPct val="90000"/>
-              </a:lnSpc>
-              <a:spcBef>
-                <a:spcPts val="2400"/>
-              </a:spcBef>
-              <a:buFontTx/>
-              <a:buNone/>
-              <a:defRPr sz="4800" kern="1200" cap="all" baseline="0">
-                <a:solidFill>
-                  <a:schemeClr val="tx1"/>
-                </a:solidFill>
-                <a:latin typeface="KievitPro-Medium" charset="0"/>
-                <a:ea typeface="+mn-ea"/>
-                <a:cs typeface="+mn-cs"/>
-              </a:defRPr>
-            </a:lvl5pPr>
-            <a:lvl6pPr marL="12070080" indent="-1097280" algn="l" defTabSz="4389120" rtl="0" eaLnBrk="1" latinLnBrk="0" hangingPunct="1">
-              <a:lnSpc>
-                <a:spcPct val="90000"/>
-              </a:lnSpc>
-              <a:spcBef>
-                <a:spcPts val="2400"/>
-              </a:spcBef>
-              <a:buFont typeface="Arial" panose="020B0604020202020204" pitchFamily="34" charset="0"/>
-              <a:buChar char="•"/>
-              <a:defRPr sz="8640" kern="1200">
-                <a:solidFill>
-                  <a:schemeClr val="tx1"/>
-                </a:solidFill>
-                <a:latin typeface="+mn-lt"/>
-                <a:ea typeface="+mn-ea"/>
-                <a:cs typeface="+mn-cs"/>
-              </a:defRPr>
-            </a:lvl6pPr>
-            <a:lvl7pPr marL="14264640" indent="-1097280" algn="l" defTabSz="4389120" rtl="0" eaLnBrk="1" latinLnBrk="0" hangingPunct="1">
-              <a:lnSpc>
-                <a:spcPct val="90000"/>
-              </a:lnSpc>
-              <a:spcBef>
-                <a:spcPts val="2400"/>
-              </a:spcBef>
-              <a:buFont typeface="Arial" panose="020B0604020202020204" pitchFamily="34" charset="0"/>
-              <a:buChar char="•"/>
-              <a:defRPr sz="8640" kern="1200">
-                <a:solidFill>
-                  <a:schemeClr val="tx1"/>
-                </a:solidFill>
-                <a:latin typeface="+mn-lt"/>
-                <a:ea typeface="+mn-ea"/>
-                <a:cs typeface="+mn-cs"/>
-              </a:defRPr>
-            </a:lvl7pPr>
-            <a:lvl8pPr marL="16459200" indent="-1097280" algn="l" defTabSz="4389120" rtl="0" eaLnBrk="1" latinLnBrk="0" hangingPunct="1">
-              <a:lnSpc>
-                <a:spcPct val="90000"/>
-              </a:lnSpc>
-              <a:spcBef>
-                <a:spcPts val="2400"/>
-              </a:spcBef>
-              <a:buFont typeface="Arial" panose="020B0604020202020204" pitchFamily="34" charset="0"/>
-              <a:buChar char="•"/>
-              <a:defRPr sz="8640" kern="1200">
-                <a:solidFill>
-                  <a:schemeClr val="tx1"/>
-                </a:solidFill>
-                <a:latin typeface="+mn-lt"/>
-                <a:ea typeface="+mn-ea"/>
-                <a:cs typeface="+mn-cs"/>
-              </a:defRPr>
-            </a:lvl8pPr>
-            <a:lvl9pPr marL="18653760" indent="-1097280" algn="l" defTabSz="4389120" rtl="0" eaLnBrk="1" latinLnBrk="0" hangingPunct="1">
-              <a:lnSpc>
-                <a:spcPct val="90000"/>
-              </a:lnSpc>
-              <a:spcBef>
-                <a:spcPts val="2400"/>
-              </a:spcBef>
-              <a:buFont typeface="Arial" panose="020B0604020202020204" pitchFamily="34" charset="0"/>
-              <a:buChar char="•"/>
-              <a:defRPr sz="8640" kern="1200">
-                <a:solidFill>
-                  <a:schemeClr val="tx1"/>
-                </a:solidFill>
-                <a:latin typeface="+mn-lt"/>
-                <a:ea typeface="+mn-ea"/>
-                <a:cs typeface="+mn-cs"/>
-              </a:defRPr>
-            </a:lvl9pPr>
-          </a:lstStyle>
-          <a:p>
-            <a:r>
-              <a:rPr lang="en-US" dirty="0">
-                <a:solidFill>
-                  <a:schemeClr val="bg1"/>
-                </a:solidFill>
-                <a:latin typeface="Verdana Regular" charset="0"/>
-              </a:rPr>
-              <a:t>Sources</a:t>
-            </a:r>
-          </a:p>
-        </p:txBody>
-      </p:sp>
-      <p:sp>
-        <p:nvSpPr>
-          <p:cNvPr id="17" name="TextBox 16">
-            <a:extLst>
-              <a:ext uri="{FF2B5EF4-FFF2-40B4-BE49-F238E27FC236}">
-                <a16:creationId xmlns:a16="http://schemas.microsoft.com/office/drawing/2014/main" id="{C4A097CA-38CD-4235-BA12-04D79D44F2F5}"/>
-              </a:ext>
-            </a:extLst>
-          </p:cNvPr>
-          <p:cNvSpPr txBox="1"/>
-          <p:nvPr/>
-        </p:nvSpPr>
-        <p:spPr>
-          <a:xfrm>
-            <a:off x="33966678" y="27008000"/>
-            <a:ext cx="9084485" cy="3975447"/>
-          </a:xfrm>
-          <a:prstGeom prst="rect">
-            <a:avLst/>
-          </a:prstGeom>
-          <a:noFill/>
-        </p:spPr>
-        <p:txBody>
-          <a:bodyPr wrap="square" rtlCol="0">
-            <a:spAutoFit/>
-          </a:bodyPr>
-          <a:lstStyle/>
-          <a:p>
-            <a:pPr>
-              <a:spcAft>
-                <a:spcPts val="2600"/>
-              </a:spcAft>
-            </a:pPr>
-            <a:r>
-              <a:rPr lang="en-US" sz="2400" dirty="0">
-                <a:latin typeface="Verdana Regular"/>
-                <a:hlinkClick r:id="rId5"/>
-              </a:rPr>
-              <a:t>https://airandspace.si.edu/multimedia-gallery/5317hjpg</a:t>
-            </a:r>
-            <a:endParaRPr lang="en-US" sz="2400" dirty="0">
-              <a:latin typeface="Verdana Regular"/>
-              <a:hlinkClick r:id="rId6"/>
-            </a:endParaRPr>
-          </a:p>
-          <a:p>
-            <a:pPr>
-              <a:spcAft>
-                <a:spcPts val="2600"/>
-              </a:spcAft>
-            </a:pPr>
-            <a:r>
-              <a:rPr lang="en-US" sz="2400" dirty="0">
-                <a:latin typeface="Verdana Regular"/>
-                <a:hlinkClick r:id="rId6"/>
-              </a:rPr>
-              <a:t>https://github.com/nasa/NASA-3D-Resources</a:t>
-            </a:r>
-            <a:endParaRPr lang="en-US" sz="2400" dirty="0">
-              <a:latin typeface="Verdana Regular"/>
-            </a:endParaRPr>
-          </a:p>
-          <a:p>
-            <a:pPr>
-              <a:spcAft>
-                <a:spcPts val="2600"/>
-              </a:spcAft>
-            </a:pPr>
-            <a:r>
-              <a:rPr lang="en-US" sz="2400" dirty="0">
-                <a:latin typeface="Verdana Regular"/>
-                <a:hlinkClick r:id="rId7"/>
-              </a:rPr>
-              <a:t>www.nasa.gov</a:t>
-            </a:r>
-            <a:endParaRPr lang="en-US" sz="2400" dirty="0">
-              <a:latin typeface="Verdana Regular"/>
-            </a:endParaRPr>
-          </a:p>
-          <a:p>
-            <a:pPr>
-              <a:spcAft>
-                <a:spcPts val="2600"/>
-              </a:spcAft>
-            </a:pPr>
-            <a:r>
-              <a:rPr lang="en-US" sz="2400" dirty="0">
-                <a:latin typeface="Verdana Regular"/>
-                <a:hlinkClick r:id="rId8"/>
-              </a:rPr>
-              <a:t>https://www.solarsystemscope.com/textures/</a:t>
-            </a:r>
-            <a:endParaRPr lang="en-US" sz="2400" dirty="0">
-              <a:latin typeface="Verdana Regular"/>
-            </a:endParaRPr>
-          </a:p>
-          <a:p>
-            <a:pPr>
-              <a:spcAft>
-                <a:spcPts val="2600"/>
-              </a:spcAft>
-            </a:pPr>
-            <a:r>
-              <a:rPr lang="en-US" sz="2400" dirty="0">
-                <a:latin typeface="Verdana Regular"/>
-                <a:hlinkClick r:id="rId9"/>
-              </a:rPr>
-              <a:t>https://www.turbosquid.com/</a:t>
-            </a:r>
-            <a:endParaRPr lang="en-US" sz="2400" dirty="0">
-              <a:latin typeface="Verdana Regular"/>
-            </a:endParaRPr>
-          </a:p>
-          <a:p>
-            <a:pPr>
-              <a:spcAft>
-                <a:spcPts val="2600"/>
-              </a:spcAft>
-            </a:pPr>
-            <a:endParaRPr lang="en-US" sz="2400" dirty="0">
-              <a:latin typeface="Verdana Regular"/>
-            </a:endParaRPr>
+              <a:rPr lang="en-US" sz="5400" dirty="0"/>
+              <a:t>Just like the astronauts, we had to determine the flight path based on the Moon’s orbit. </a:t>
+            </a:r>
           </a:p>
         </p:txBody>
       </p:sp>
@@ -4804,7 +4311,7 @@
         </p:nvSpPr>
         <p:spPr>
           <a:xfrm>
-            <a:off x="1931988" y="14887226"/>
+            <a:off x="1931988" y="20879871"/>
             <a:ext cx="8158690" cy="677108"/>
           </a:xfrm>
           <a:prstGeom prst="rect">
@@ -5008,7 +4515,7 @@
         </p:nvSpPr>
         <p:spPr>
           <a:xfrm>
-            <a:off x="1968846" y="15886953"/>
+            <a:off x="1964267" y="22042522"/>
             <a:ext cx="8126412" cy="4453848"/>
           </a:xfrm>
           <a:prstGeom prst="rect">
@@ -5258,6 +4765,300 @@
               <a:ea typeface="Verdana" charset="0"/>
               <a:cs typeface="Verdana" charset="0"/>
             </a:endParaRPr>
+          </a:p>
+        </p:txBody>
+      </p:sp>
+      <p:sp>
+        <p:nvSpPr>
+          <p:cNvPr id="23" name="Text Placeholder 16">
+            <a:extLst>
+              <a:ext uri="{FF2B5EF4-FFF2-40B4-BE49-F238E27FC236}">
+                <a16:creationId xmlns:a16="http://schemas.microsoft.com/office/drawing/2014/main" id="{D2A5A91A-B132-4F29-86DF-1BE27B9C8FCE}"/>
+              </a:ext>
+            </a:extLst>
+          </p:cNvPr>
+          <p:cNvSpPr txBox="1">
+            <a:spLocks/>
+          </p:cNvSpPr>
+          <p:nvPr/>
+        </p:nvSpPr>
+        <p:spPr>
+          <a:xfrm>
+            <a:off x="1964267" y="13225487"/>
+            <a:ext cx="8158690" cy="677108"/>
+          </a:xfrm>
+          <a:prstGeom prst="rect">
+            <a:avLst/>
+          </a:prstGeom>
+        </p:spPr>
+        <p:txBody>
+          <a:bodyPr wrap="square" lIns="0" tIns="0" rIns="0" bIns="0">
+            <a:spAutoFit/>
+          </a:bodyPr>
+          <a:lstStyle>
+            <a:lvl1pPr marL="0" indent="0" algn="l" defTabSz="4389120" rtl="0" eaLnBrk="1" latinLnBrk="0" hangingPunct="1">
+              <a:lnSpc>
+                <a:spcPct val="90000"/>
+              </a:lnSpc>
+              <a:spcBef>
+                <a:spcPts val="4800"/>
+              </a:spcBef>
+              <a:buFontTx/>
+              <a:buNone/>
+              <a:defRPr sz="4800" kern="1200" cap="all" baseline="0">
+                <a:solidFill>
+                  <a:schemeClr val="tx1"/>
+                </a:solidFill>
+                <a:latin typeface="KievitPro-Medium" charset="0"/>
+                <a:ea typeface="+mn-ea"/>
+                <a:cs typeface="+mn-cs"/>
+              </a:defRPr>
+            </a:lvl1pPr>
+            <a:lvl2pPr marL="2194560" indent="0" algn="l" defTabSz="4389120" rtl="0" eaLnBrk="1" latinLnBrk="0" hangingPunct="1">
+              <a:lnSpc>
+                <a:spcPct val="90000"/>
+              </a:lnSpc>
+              <a:spcBef>
+                <a:spcPts val="2400"/>
+              </a:spcBef>
+              <a:buFontTx/>
+              <a:buNone/>
+              <a:defRPr sz="4800" kern="1200" cap="all" baseline="0">
+                <a:solidFill>
+                  <a:schemeClr val="tx1"/>
+                </a:solidFill>
+                <a:latin typeface="KievitPro-Medium" charset="0"/>
+                <a:ea typeface="+mn-ea"/>
+                <a:cs typeface="+mn-cs"/>
+              </a:defRPr>
+            </a:lvl2pPr>
+            <a:lvl3pPr marL="4389120" indent="0" algn="l" defTabSz="4389120" rtl="0" eaLnBrk="1" latinLnBrk="0" hangingPunct="1">
+              <a:lnSpc>
+                <a:spcPct val="90000"/>
+              </a:lnSpc>
+              <a:spcBef>
+                <a:spcPts val="2400"/>
+              </a:spcBef>
+              <a:buFontTx/>
+              <a:buNone/>
+              <a:defRPr sz="4800" kern="1200" cap="all" baseline="0">
+                <a:solidFill>
+                  <a:schemeClr val="tx1"/>
+                </a:solidFill>
+                <a:latin typeface="KievitPro-Medium" charset="0"/>
+                <a:ea typeface="+mn-ea"/>
+                <a:cs typeface="+mn-cs"/>
+              </a:defRPr>
+            </a:lvl3pPr>
+            <a:lvl4pPr marL="6583680" indent="0" algn="l" defTabSz="4389120" rtl="0" eaLnBrk="1" latinLnBrk="0" hangingPunct="1">
+              <a:lnSpc>
+                <a:spcPct val="90000"/>
+              </a:lnSpc>
+              <a:spcBef>
+                <a:spcPts val="2400"/>
+              </a:spcBef>
+              <a:buFontTx/>
+              <a:buNone/>
+              <a:defRPr sz="4800" kern="1200" cap="all" baseline="0">
+                <a:solidFill>
+                  <a:schemeClr val="tx1"/>
+                </a:solidFill>
+                <a:latin typeface="KievitPro-Medium" charset="0"/>
+                <a:ea typeface="+mn-ea"/>
+                <a:cs typeface="+mn-cs"/>
+              </a:defRPr>
+            </a:lvl4pPr>
+            <a:lvl5pPr marL="8778240" indent="0" algn="l" defTabSz="4389120" rtl="0" eaLnBrk="1" latinLnBrk="0" hangingPunct="1">
+              <a:lnSpc>
+                <a:spcPct val="90000"/>
+              </a:lnSpc>
+              <a:spcBef>
+                <a:spcPts val="2400"/>
+              </a:spcBef>
+              <a:buFontTx/>
+              <a:buNone/>
+              <a:defRPr sz="4800" kern="1200" cap="all" baseline="0">
+                <a:solidFill>
+                  <a:schemeClr val="tx1"/>
+                </a:solidFill>
+                <a:latin typeface="KievitPro-Medium" charset="0"/>
+                <a:ea typeface="+mn-ea"/>
+                <a:cs typeface="+mn-cs"/>
+              </a:defRPr>
+            </a:lvl5pPr>
+            <a:lvl6pPr marL="12070080" indent="-1097280" algn="l" defTabSz="4389120" rtl="0" eaLnBrk="1" latinLnBrk="0" hangingPunct="1">
+              <a:lnSpc>
+                <a:spcPct val="90000"/>
+              </a:lnSpc>
+              <a:spcBef>
+                <a:spcPts val="2400"/>
+              </a:spcBef>
+              <a:buFont typeface="Arial" panose="020B0604020202020204" pitchFamily="34" charset="0"/>
+              <a:buChar char="•"/>
+              <a:defRPr sz="8640" kern="1200">
+                <a:solidFill>
+                  <a:schemeClr val="tx1"/>
+                </a:solidFill>
+                <a:latin typeface="+mn-lt"/>
+                <a:ea typeface="+mn-ea"/>
+                <a:cs typeface="+mn-cs"/>
+              </a:defRPr>
+            </a:lvl6pPr>
+            <a:lvl7pPr marL="14264640" indent="-1097280" algn="l" defTabSz="4389120" rtl="0" eaLnBrk="1" latinLnBrk="0" hangingPunct="1">
+              <a:lnSpc>
+                <a:spcPct val="90000"/>
+              </a:lnSpc>
+              <a:spcBef>
+                <a:spcPts val="2400"/>
+              </a:spcBef>
+              <a:buFont typeface="Arial" panose="020B0604020202020204" pitchFamily="34" charset="0"/>
+              <a:buChar char="•"/>
+              <a:defRPr sz="8640" kern="1200">
+                <a:solidFill>
+                  <a:schemeClr val="tx1"/>
+                </a:solidFill>
+                <a:latin typeface="+mn-lt"/>
+                <a:ea typeface="+mn-ea"/>
+                <a:cs typeface="+mn-cs"/>
+              </a:defRPr>
+            </a:lvl7pPr>
+            <a:lvl8pPr marL="16459200" indent="-1097280" algn="l" defTabSz="4389120" rtl="0" eaLnBrk="1" latinLnBrk="0" hangingPunct="1">
+              <a:lnSpc>
+                <a:spcPct val="90000"/>
+              </a:lnSpc>
+              <a:spcBef>
+                <a:spcPts val="2400"/>
+              </a:spcBef>
+              <a:buFont typeface="Arial" panose="020B0604020202020204" pitchFamily="34" charset="0"/>
+              <a:buChar char="•"/>
+              <a:defRPr sz="8640" kern="1200">
+                <a:solidFill>
+                  <a:schemeClr val="tx1"/>
+                </a:solidFill>
+                <a:latin typeface="+mn-lt"/>
+                <a:ea typeface="+mn-ea"/>
+                <a:cs typeface="+mn-cs"/>
+              </a:defRPr>
+            </a:lvl8pPr>
+            <a:lvl9pPr marL="18653760" indent="-1097280" algn="l" defTabSz="4389120" rtl="0" eaLnBrk="1" latinLnBrk="0" hangingPunct="1">
+              <a:lnSpc>
+                <a:spcPct val="90000"/>
+              </a:lnSpc>
+              <a:spcBef>
+                <a:spcPts val="2400"/>
+              </a:spcBef>
+              <a:buFont typeface="Arial" panose="020B0604020202020204" pitchFamily="34" charset="0"/>
+              <a:buChar char="•"/>
+              <a:defRPr sz="8640" kern="1200">
+                <a:solidFill>
+                  <a:schemeClr val="tx1"/>
+                </a:solidFill>
+                <a:latin typeface="+mn-lt"/>
+                <a:ea typeface="+mn-ea"/>
+                <a:cs typeface="+mn-cs"/>
+              </a:defRPr>
+            </a:lvl9pPr>
+          </a:lstStyle>
+          <a:p>
+            <a:r>
+              <a:rPr lang="en-US" dirty="0">
+                <a:solidFill>
+                  <a:srgbClr val="FFFFFF"/>
+                </a:solidFill>
+                <a:latin typeface="Verdana Regular" charset="0"/>
+              </a:rPr>
+              <a:t>OMSI</a:t>
+            </a:r>
+          </a:p>
+        </p:txBody>
+      </p:sp>
+      <p:pic>
+        <p:nvPicPr>
+          <p:cNvPr id="5" name="Picture 2" descr="Image result for earth from moon">
+            <a:extLst>
+              <a:ext uri="{FF2B5EF4-FFF2-40B4-BE49-F238E27FC236}">
+                <a16:creationId xmlns:a16="http://schemas.microsoft.com/office/drawing/2014/main" id="{0BACEAB0-7814-4BC1-AA2C-76801EA0C8F4}"/>
+              </a:ext>
+            </a:extLst>
+          </p:cNvPr>
+          <p:cNvPicPr>
+            <a:picLocks noChangeAspect="1" noChangeArrowheads="1"/>
+          </p:cNvPicPr>
+          <p:nvPr/>
+        </p:nvPicPr>
+        <p:blipFill>
+          <a:blip r:embed="rId5">
+            <a:extLst>
+              <a:ext uri="{28A0092B-C50C-407E-A947-70E740481C1C}">
+                <a14:useLocalDpi xmlns:a14="http://schemas.microsoft.com/office/drawing/2010/main" val="0"/>
+              </a:ext>
+            </a:extLst>
+          </a:blip>
+          <a:srcRect/>
+          <a:stretch>
+            <a:fillRect/>
+          </a:stretch>
+        </p:blipFill>
+        <p:spPr bwMode="auto">
+          <a:xfrm>
+            <a:off x="12246292" y="23715406"/>
+            <a:ext cx="10206716" cy="6798652"/>
+          </a:xfrm>
+          <a:prstGeom prst="rect">
+            <a:avLst/>
+          </a:prstGeom>
+          <a:noFill/>
+          <a:extLst>
+            <a:ext uri="{909E8E84-426E-40DD-AFC4-6F175D3DCCD1}">
+              <a14:hiddenFill xmlns:a14="http://schemas.microsoft.com/office/drawing/2010/main">
+                <a:solidFill>
+                  <a:srgbClr val="FFFFFF"/>
+                </a:solidFill>
+              </a14:hiddenFill>
+            </a:ext>
+          </a:extLst>
+        </p:spPr>
+      </p:pic>
+      <p:sp>
+        <p:nvSpPr>
+          <p:cNvPr id="22" name="TextBox 21">
+            <a:extLst>
+              <a:ext uri="{FF2B5EF4-FFF2-40B4-BE49-F238E27FC236}">
+                <a16:creationId xmlns:a16="http://schemas.microsoft.com/office/drawing/2014/main" id="{9EE96DB4-CCD4-4717-889B-AABA259CFCAC}"/>
+              </a:ext>
+            </a:extLst>
+          </p:cNvPr>
+          <p:cNvSpPr txBox="1"/>
+          <p:nvPr/>
+        </p:nvSpPr>
+        <p:spPr>
+          <a:xfrm flipH="1">
+            <a:off x="22453007" y="24835675"/>
+            <a:ext cx="9615907" cy="5262979"/>
+          </a:xfrm>
+          <a:prstGeom prst="rect">
+            <a:avLst/>
+          </a:prstGeom>
+          <a:noFill/>
+        </p:spPr>
+        <p:txBody>
+          <a:bodyPr wrap="square" rtlCol="0">
+            <a:spAutoFit/>
+          </a:bodyPr>
+          <a:lstStyle/>
+          <a:p>
+            <a:pPr algn="ctr"/>
+            <a:r>
+              <a:rPr lang="en-US" sz="6600" b="1" dirty="0"/>
+              <a:t>What a View</a:t>
+            </a:r>
+          </a:p>
+          <a:p>
+            <a:pPr algn="ctr"/>
+            <a:r>
+              <a:rPr lang="en-US" sz="5400" dirty="0"/>
+              <a:t>3D animation allows viewers to see exactly what astronauts saw while they were on the Moon, as well as having more freedom to move around.</a:t>
+            </a:r>
           </a:p>
         </p:txBody>
       </p:sp>

</xml_diff>

<commit_message>
Submitted poster for review
</commit_message>
<xml_diff>
--- a/Group49_Poster.pptx
+++ b/Group49_Poster.pptx
@@ -255,7 +255,7 @@
             <a:fld id="{9CF59EBC-EC05-6B4D-B166-DDFA6A1EDCB6}" type="datetimeFigureOut">
               <a:rPr lang="en-US" smtClean="0"/>
               <a:pPr/>
-              <a:t>4/12/2019</a:t>
+              <a:t>4/26/2019</a:t>
             </a:fld>
             <a:endParaRPr lang="en-US" dirty="0"/>
           </a:p>
@@ -2480,7 +2480,41 @@
               <a:rPr lang="en-US" dirty="0">
                 <a:latin typeface="Verdana Regular" charset="0"/>
               </a:rPr>
-              <a:t>Student Team:</a:t>
+              <a:t>Student Team (Left to right):</a:t>
+            </a:r>
+          </a:p>
+          <a:p>
+            <a:pPr marL="0" indent="0">
+              <a:lnSpc>
+                <a:spcPct val="100000"/>
+              </a:lnSpc>
+              <a:spcAft>
+                <a:spcPts val="2600"/>
+              </a:spcAft>
+              <a:buNone/>
+            </a:pPr>
+            <a:r>
+              <a:rPr lang="en-US" dirty="0">
+                <a:latin typeface="Verdana Regular" charset="0"/>
+              </a:rPr>
+              <a:t>  Jonathan Ropp – roppjo@oregonstate.edu</a:t>
+            </a:r>
+          </a:p>
+          <a:p>
+            <a:pPr marL="0" indent="0">
+              <a:lnSpc>
+                <a:spcPct val="100000"/>
+              </a:lnSpc>
+              <a:spcAft>
+                <a:spcPts val="2600"/>
+              </a:spcAft>
+              <a:buNone/>
+            </a:pPr>
+            <a:r>
+              <a:rPr lang="en-US" dirty="0">
+                <a:latin typeface="Verdana Regular" charset="0"/>
+              </a:rPr>
+              <a:t>  Shannon Sandy – sandys@oregonstate.edu </a:t>
             </a:r>
           </a:p>
           <a:p>
@@ -2498,40 +2532,6 @@
                 <a:latin typeface="Verdana Regular" charset="0"/>
               </a:rPr>
               <a:t>  Dean Akin – akind@oregonstate.edu</a:t>
-            </a:r>
-          </a:p>
-          <a:p>
-            <a:pPr marL="0" indent="0">
-              <a:lnSpc>
-                <a:spcPct val="100000"/>
-              </a:lnSpc>
-              <a:spcAft>
-                <a:spcPts val="2600"/>
-              </a:spcAft>
-              <a:buNone/>
-            </a:pPr>
-            <a:r>
-              <a:rPr lang="en-US" dirty="0">
-                <a:latin typeface="Verdana Regular" charset="0"/>
-              </a:rPr>
-              <a:t>  Jonathan Ropp – roppjo@oregonstate.edu</a:t>
-            </a:r>
-          </a:p>
-          <a:p>
-            <a:pPr marL="0" indent="0">
-              <a:lnSpc>
-                <a:spcPct val="100000"/>
-              </a:lnSpc>
-              <a:spcAft>
-                <a:spcPts val="2600"/>
-              </a:spcAft>
-              <a:buNone/>
-            </a:pPr>
-            <a:r>
-              <a:rPr lang="en-US" dirty="0">
-                <a:latin typeface="Verdana Regular" charset="0"/>
-              </a:rPr>
-              <a:t>  Shannon Sandy – sandys@oregonstate.edu </a:t>
             </a:r>
           </a:p>
           <a:p>
@@ -3430,7 +3430,7 @@
         </p:nvSpPr>
         <p:spPr>
           <a:xfrm>
-            <a:off x="33934401" y="5503233"/>
+            <a:off x="33934401" y="3467715"/>
             <a:ext cx="8158690" cy="677108"/>
           </a:xfrm>
           <a:prstGeom prst="rect">
@@ -3628,7 +3628,7 @@
         </p:nvSpPr>
         <p:spPr>
           <a:xfrm>
-            <a:off x="33966678" y="6422030"/>
+            <a:off x="33934401" y="4379412"/>
             <a:ext cx="8126412" cy="12666353"/>
           </a:xfrm>
           <a:prstGeom prst="rect">
@@ -3915,7 +3915,7 @@
               <a:rPr lang="en-US" dirty="0">
                 <a:latin typeface="Verdana Regular" charset="0"/>
               </a:rPr>
-              <a:t>         -Bezier Curves</a:t>
+              <a:t>         -Parametric Curves</a:t>
             </a:r>
           </a:p>
           <a:p>
@@ -3975,7 +3975,7 @@
               <a:rPr lang="en-US" dirty="0">
                 <a:latin typeface="Verdana Regular" charset="0"/>
               </a:rPr>
-              <a:t>All objects individually scaled and positioned using realistic transformations</a:t>
+              <a:t>All objects individually scaled and positioned using consistent scales</a:t>
             </a:r>
           </a:p>
           <a:p>
@@ -4064,151 +4064,6 @@
           </a:p>
         </p:txBody>
       </p:sp>
-      <p:pic>
-        <p:nvPicPr>
-          <p:cNvPr id="1026" name="Picture 2" descr="Image result for apollo 11">
-            <a:extLst>
-              <a:ext uri="{FF2B5EF4-FFF2-40B4-BE49-F238E27FC236}">
-                <a16:creationId xmlns:a16="http://schemas.microsoft.com/office/drawing/2014/main" id="{64215957-64E7-4226-9FBC-FAEAA0FB38DA}"/>
-              </a:ext>
-            </a:extLst>
-          </p:cNvPr>
-          <p:cNvPicPr>
-            <a:picLocks noGrp="1" noChangeAspect="1" noChangeArrowheads="1"/>
-          </p:cNvPicPr>
-          <p:nvPr>
-            <p:ph type="pic" sz="quarter" idx="10"/>
-          </p:nvPr>
-        </p:nvPicPr>
-        <p:blipFill>
-          <a:blip r:embed="rId2">
-            <a:extLst>
-              <a:ext uri="{28A0092B-C50C-407E-A947-70E740481C1C}">
-                <a14:useLocalDpi xmlns:a14="http://schemas.microsoft.com/office/drawing/2010/main" val="0"/>
-              </a:ext>
-            </a:extLst>
-          </a:blip>
-          <a:srcRect t="8239" b="8239"/>
-          <a:stretch>
-            <a:fillRect/>
-          </a:stretch>
-        </p:blipFill>
-        <p:spPr bwMode="auto">
-          <a:xfrm>
-            <a:off x="12246292" y="7797754"/>
-            <a:ext cx="9937490" cy="6220405"/>
-          </a:xfrm>
-          <a:prstGeom prst="rect">
-            <a:avLst/>
-          </a:prstGeom>
-          <a:noFill/>
-          <a:extLst>
-            <a:ext uri="{909E8E84-426E-40DD-AFC4-6F175D3DCCD1}">
-              <a14:hiddenFill xmlns:a14="http://schemas.microsoft.com/office/drawing/2010/main">
-                <a:solidFill>
-                  <a:srgbClr val="FFFFFF"/>
-                </a:solidFill>
-              </a14:hiddenFill>
-            </a:ext>
-          </a:extLst>
-        </p:spPr>
-      </p:pic>
-      <p:pic>
-        <p:nvPicPr>
-          <p:cNvPr id="1028" name="Picture 4" descr="Image result for apollo 11">
-            <a:extLst>
-              <a:ext uri="{FF2B5EF4-FFF2-40B4-BE49-F238E27FC236}">
-                <a16:creationId xmlns:a16="http://schemas.microsoft.com/office/drawing/2014/main" id="{F4C48368-F66E-4F5B-8709-1D430BDF6626}"/>
-              </a:ext>
-            </a:extLst>
-          </p:cNvPr>
-          <p:cNvPicPr>
-            <a:picLocks noGrp="1" noChangeAspect="1" noChangeArrowheads="1"/>
-          </p:cNvPicPr>
-          <p:nvPr>
-            <p:ph type="pic" sz="quarter" idx="11"/>
-          </p:nvPr>
-        </p:nvPicPr>
-        <p:blipFill>
-          <a:blip r:embed="rId3">
-            <a:extLst>
-              <a:ext uri="{28A0092B-C50C-407E-A947-70E740481C1C}">
-                <a14:useLocalDpi xmlns:a14="http://schemas.microsoft.com/office/drawing/2010/main" val="0"/>
-              </a:ext>
-            </a:extLst>
-          </a:blip>
-          <a:srcRect l="15504" r="15504"/>
-          <a:stretch>
-            <a:fillRect/>
-          </a:stretch>
-        </p:blipFill>
-        <p:spPr bwMode="auto">
-          <a:xfrm>
-            <a:off x="35343718" y="17945099"/>
-            <a:ext cx="5372332" cy="6115991"/>
-          </a:xfrm>
-          <a:prstGeom prst="rect">
-            <a:avLst/>
-          </a:prstGeom>
-          <a:noFill/>
-          <a:extLst>
-            <a:ext uri="{909E8E84-426E-40DD-AFC4-6F175D3DCCD1}">
-              <a14:hiddenFill xmlns:a14="http://schemas.microsoft.com/office/drawing/2010/main">
-                <a:solidFill>
-                  <a:srgbClr val="FFFFFF"/>
-                </a:solidFill>
-              </a14:hiddenFill>
-            </a:ext>
-          </a:extLst>
-        </p:spPr>
-      </p:pic>
-      <p:pic>
-        <p:nvPicPr>
-          <p:cNvPr id="1030" name="Picture 6" descr="Image result for apollo 11 flight path">
-            <a:extLst>
-              <a:ext uri="{FF2B5EF4-FFF2-40B4-BE49-F238E27FC236}">
-                <a16:creationId xmlns:a16="http://schemas.microsoft.com/office/drawing/2014/main" id="{3F73B30B-38E0-4531-BB07-8BFC17D7FF11}"/>
-              </a:ext>
-            </a:extLst>
-          </p:cNvPr>
-          <p:cNvPicPr>
-            <a:picLocks noChangeAspect="1" noChangeArrowheads="1"/>
-          </p:cNvPicPr>
-          <p:nvPr/>
-        </p:nvPicPr>
-        <p:blipFill>
-          <a:blip r:embed="rId4">
-            <a:extLst>
-              <a:ext uri="{28A0092B-C50C-407E-A947-70E740481C1C}">
-                <a14:useLocalDpi xmlns:a14="http://schemas.microsoft.com/office/drawing/2010/main" val="0"/>
-              </a:ext>
-            </a:extLst>
-          </a:blip>
-          <a:srcRect/>
-          <a:stretch>
-            <a:fillRect/>
-          </a:stretch>
-        </p:blipFill>
-        <p:spPr bwMode="auto">
-          <a:xfrm>
-            <a:off x="19109982" y="15900805"/>
-            <a:ext cx="12958934" cy="5700916"/>
-          </a:xfrm>
-          <a:prstGeom prst="rect">
-            <a:avLst/>
-          </a:prstGeom>
-          <a:noFill/>
-          <a:extLst>
-            <a:ext uri="{909E8E84-426E-40DD-AFC4-6F175D3DCCD1}">
-              <a14:hiddenFill xmlns:a14="http://schemas.microsoft.com/office/drawing/2010/main">
-                <a:solidFill>
-                  <a:srgbClr val="FFFFFF"/>
-                </a:solidFill>
-              </a14:hiddenFill>
-            </a:ext>
-          </a:extLst>
-        </p:spPr>
-      </p:pic>
       <p:sp>
         <p:nvSpPr>
           <p:cNvPr id="2" name="TextBox 1">
@@ -4290,7 +4145,7 @@
             <a:pPr algn="ctr"/>
             <a:r>
               <a:rPr lang="en-US" sz="5400" dirty="0"/>
-              <a:t>Just like the astronauts, we had to determine the flight path based on the Moon’s orbit. </a:t>
+              <a:t>Just like NASA, we had to determine the flight path based on the Moon’s position and orbit. </a:t>
             </a:r>
           </a:p>
         </p:txBody>
@@ -4972,53 +4827,6 @@
           </a:p>
         </p:txBody>
       </p:sp>
-      <p:pic>
-        <p:nvPicPr>
-          <p:cNvPr id="5" name="Picture 2" descr="Image result for earth from moon">
-            <a:extLst>
-              <a:ext uri="{FF2B5EF4-FFF2-40B4-BE49-F238E27FC236}">
-                <a16:creationId xmlns:a16="http://schemas.microsoft.com/office/drawing/2014/main" id="{0BACEAB0-7814-4BC1-AA2C-76801EA0C8F4}"/>
-              </a:ext>
-            </a:extLst>
-          </p:cNvPr>
-          <p:cNvPicPr>
-            <a:picLocks noChangeAspect="1" noChangeArrowheads="1"/>
-          </p:cNvPicPr>
-          <p:nvPr/>
-        </p:nvPicPr>
-        <p:blipFill>
-          <a:blip r:embed="rId5">
-            <a:extLst>
-              <a:ext uri="{28A0092B-C50C-407E-A947-70E740481C1C}">
-                <a14:useLocalDpi xmlns:a14="http://schemas.microsoft.com/office/drawing/2010/main" val="0"/>
-              </a:ext>
-            </a:extLst>
-          </a:blip>
-          <a:srcRect/>
-          <a:stretch>
-            <a:fillRect/>
-          </a:stretch>
-        </p:blipFill>
-        <p:spPr bwMode="auto">
-          <a:xfrm>
-            <a:off x="12246292" y="23715406"/>
-            <a:ext cx="10206716" cy="6798652"/>
-          </a:xfrm>
-          <a:prstGeom prst="rect">
-            <a:avLst/>
-          </a:prstGeom>
-          <a:noFill/>
-          <a:extLst>
-            <a:ext uri="{909E8E84-426E-40DD-AFC4-6F175D3DCCD1}">
-              <a14:hiddenFill xmlns:a14="http://schemas.microsoft.com/office/drawing/2010/main">
-                <a:solidFill>
-                  <a:srgbClr val="FFFFFF"/>
-                </a:solidFill>
-              </a14:hiddenFill>
-            </a:ext>
-          </a:extLst>
-        </p:spPr>
-      </p:pic>
       <p:sp>
         <p:nvSpPr>
           <p:cNvPr id="22" name="TextBox 21">
@@ -5057,11 +4865,248 @@
             <a:pPr algn="ctr"/>
             <a:r>
               <a:rPr lang="en-US" sz="5400" dirty="0"/>
-              <a:t>3D animation allows viewers to see exactly what astronauts saw while they were on the Moon, as well as having more freedom to move around.</a:t>
+              <a:t>3D animation allows viewers to see what astronauts saw while they were on the Moon, as well as having more freedom to move a camera around the scene.</a:t>
             </a:r>
           </a:p>
         </p:txBody>
       </p:sp>
+      <p:pic>
+        <p:nvPicPr>
+          <p:cNvPr id="6" name="Picture 5">
+            <a:extLst>
+              <a:ext uri="{FF2B5EF4-FFF2-40B4-BE49-F238E27FC236}">
+                <a16:creationId xmlns:a16="http://schemas.microsoft.com/office/drawing/2014/main" id="{6627CA71-8DD3-4780-B78E-ED5761766585}"/>
+              </a:ext>
+            </a:extLst>
+          </p:cNvPr>
+          <p:cNvPicPr>
+            <a:picLocks noChangeAspect="1"/>
+          </p:cNvPicPr>
+          <p:nvPr/>
+        </p:nvPicPr>
+        <p:blipFill>
+          <a:blip r:embed="rId2"/>
+          <a:stretch>
+            <a:fillRect/>
+          </a:stretch>
+        </p:blipFill>
+        <p:spPr>
+          <a:xfrm>
+            <a:off x="34433162" y="16022842"/>
+            <a:ext cx="7128889" cy="8116091"/>
+          </a:xfrm>
+          <a:prstGeom prst="rect">
+            <a:avLst/>
+          </a:prstGeom>
+          <a:solidFill>
+            <a:srgbClr val="FFFFFF">
+              <a:shade val="85000"/>
+            </a:srgbClr>
+          </a:solidFill>
+          <a:ln w="88900" cap="sq">
+            <a:solidFill>
+              <a:srgbClr val="FFFFFF"/>
+            </a:solidFill>
+            <a:miter lim="800000"/>
+          </a:ln>
+          <a:effectLst>
+            <a:outerShdw blurRad="55000" dist="18000" dir="5400000" algn="tl" rotWithShape="0">
+              <a:srgbClr val="000000">
+                <a:alpha val="40000"/>
+              </a:srgbClr>
+            </a:outerShdw>
+          </a:effectLst>
+          <a:scene3d>
+            <a:camera prst="orthographicFront"/>
+            <a:lightRig rig="twoPt" dir="t">
+              <a:rot lat="0" lon="0" rev="7200000"/>
+            </a:lightRig>
+          </a:scene3d>
+          <a:sp3d>
+            <a:bevelT w="25400" h="19050"/>
+            <a:contourClr>
+              <a:srgbClr val="FFFFFF"/>
+            </a:contourClr>
+          </a:sp3d>
+        </p:spPr>
+      </p:pic>
+      <p:pic>
+        <p:nvPicPr>
+          <p:cNvPr id="21" name="Picture 20">
+            <a:extLst>
+              <a:ext uri="{FF2B5EF4-FFF2-40B4-BE49-F238E27FC236}">
+                <a16:creationId xmlns:a16="http://schemas.microsoft.com/office/drawing/2014/main" id="{C4EBADA2-E005-467A-AA4B-F4FDF04A945D}"/>
+              </a:ext>
+            </a:extLst>
+          </p:cNvPr>
+          <p:cNvPicPr>
+            <a:picLocks noChangeAspect="1"/>
+          </p:cNvPicPr>
+          <p:nvPr/>
+        </p:nvPicPr>
+        <p:blipFill rotWithShape="1">
+          <a:blip r:embed="rId3"/>
+          <a:srcRect t="13421" b="14357"/>
+          <a:stretch/>
+        </p:blipFill>
+        <p:spPr>
+          <a:xfrm>
+            <a:off x="19569602" y="16523368"/>
+            <a:ext cx="12586657" cy="5041839"/>
+          </a:xfrm>
+          <a:prstGeom prst="rect">
+            <a:avLst/>
+          </a:prstGeom>
+          <a:solidFill>
+            <a:srgbClr val="FFFFFF">
+              <a:shade val="85000"/>
+            </a:srgbClr>
+          </a:solidFill>
+          <a:ln w="88900" cap="sq">
+            <a:solidFill>
+              <a:srgbClr val="FFFFFF"/>
+            </a:solidFill>
+            <a:miter lim="800000"/>
+          </a:ln>
+          <a:effectLst>
+            <a:outerShdw blurRad="55000" dist="18000" dir="5400000" algn="tl" rotWithShape="0">
+              <a:srgbClr val="000000">
+                <a:alpha val="40000"/>
+              </a:srgbClr>
+            </a:outerShdw>
+          </a:effectLst>
+          <a:scene3d>
+            <a:camera prst="orthographicFront"/>
+            <a:lightRig rig="twoPt" dir="t">
+              <a:rot lat="0" lon="0" rev="7200000"/>
+            </a:lightRig>
+          </a:scene3d>
+          <a:sp3d>
+            <a:bevelT w="25400" h="19050"/>
+            <a:contourClr>
+              <a:srgbClr val="FFFFFF"/>
+            </a:contourClr>
+          </a:sp3d>
+        </p:spPr>
+      </p:pic>
+      <p:pic>
+        <p:nvPicPr>
+          <p:cNvPr id="27" name="Picture 26">
+            <a:extLst>
+              <a:ext uri="{FF2B5EF4-FFF2-40B4-BE49-F238E27FC236}">
+                <a16:creationId xmlns:a16="http://schemas.microsoft.com/office/drawing/2014/main" id="{FA67B182-4CA1-4109-B713-795C4597B4FE}"/>
+              </a:ext>
+            </a:extLst>
+          </p:cNvPr>
+          <p:cNvPicPr>
+            <a:picLocks noChangeAspect="1"/>
+          </p:cNvPicPr>
+          <p:nvPr/>
+        </p:nvPicPr>
+        <p:blipFill rotWithShape="1">
+          <a:blip r:embed="rId4"/>
+          <a:srcRect l="5982" t="13396" r="8812" b="4239"/>
+          <a:stretch/>
+        </p:blipFill>
+        <p:spPr>
+          <a:xfrm>
+            <a:off x="11845728" y="23653507"/>
+            <a:ext cx="10165739" cy="6817045"/>
+          </a:xfrm>
+          <a:prstGeom prst="rect">
+            <a:avLst/>
+          </a:prstGeom>
+          <a:solidFill>
+            <a:srgbClr val="FFFFFF">
+              <a:shade val="85000"/>
+            </a:srgbClr>
+          </a:solidFill>
+          <a:ln w="88900" cap="sq">
+            <a:solidFill>
+              <a:srgbClr val="FFFFFF"/>
+            </a:solidFill>
+            <a:miter lim="800000"/>
+          </a:ln>
+          <a:effectLst>
+            <a:outerShdw blurRad="55000" dist="18000" dir="5400000" algn="tl" rotWithShape="0">
+              <a:srgbClr val="000000">
+                <a:alpha val="40000"/>
+              </a:srgbClr>
+            </a:outerShdw>
+          </a:effectLst>
+          <a:scene3d>
+            <a:camera prst="orthographicFront"/>
+            <a:lightRig rig="twoPt" dir="t">
+              <a:rot lat="0" lon="0" rev="7200000"/>
+            </a:lightRig>
+          </a:scene3d>
+          <a:sp3d>
+            <a:bevelT w="25400" h="19050"/>
+            <a:contourClr>
+              <a:srgbClr val="FFFFFF"/>
+            </a:contourClr>
+          </a:sp3d>
+        </p:spPr>
+      </p:pic>
+      <p:pic>
+        <p:nvPicPr>
+          <p:cNvPr id="30" name="Picture 29">
+            <a:extLst>
+              <a:ext uri="{FF2B5EF4-FFF2-40B4-BE49-F238E27FC236}">
+                <a16:creationId xmlns:a16="http://schemas.microsoft.com/office/drawing/2014/main" id="{B51EAF4F-5353-4FAF-A75E-56AEEF93A11B}"/>
+              </a:ext>
+            </a:extLst>
+          </p:cNvPr>
+          <p:cNvPicPr>
+            <a:picLocks noChangeAspect="1"/>
+          </p:cNvPicPr>
+          <p:nvPr/>
+        </p:nvPicPr>
+        <p:blipFill rotWithShape="1">
+          <a:blip r:embed="rId5"/>
+          <a:srcRect t="12581" r="2924" b="16791"/>
+          <a:stretch/>
+        </p:blipFill>
+        <p:spPr>
+          <a:xfrm>
+            <a:off x="11827633" y="8772355"/>
+            <a:ext cx="10117968" cy="5312777"/>
+          </a:xfrm>
+          <a:prstGeom prst="rect">
+            <a:avLst/>
+          </a:prstGeom>
+          <a:solidFill>
+            <a:srgbClr val="FFFFFF">
+              <a:shade val="85000"/>
+            </a:srgbClr>
+          </a:solidFill>
+          <a:ln w="88900" cap="sq">
+            <a:solidFill>
+              <a:srgbClr val="FFFFFF"/>
+            </a:solidFill>
+            <a:miter lim="800000"/>
+          </a:ln>
+          <a:effectLst>
+            <a:outerShdw blurRad="55000" dist="18000" dir="5400000" algn="tl" rotWithShape="0">
+              <a:srgbClr val="000000">
+                <a:alpha val="40000"/>
+              </a:srgbClr>
+            </a:outerShdw>
+          </a:effectLst>
+          <a:scene3d>
+            <a:camera prst="orthographicFront"/>
+            <a:lightRig rig="twoPt" dir="t">
+              <a:rot lat="0" lon="0" rev="7200000"/>
+            </a:lightRig>
+          </a:scene3d>
+          <a:sp3d>
+            <a:bevelT w="25400" h="19050"/>
+            <a:contourClr>
+              <a:srgbClr val="FFFFFF"/>
+            </a:contourClr>
+          </a:sp3d>
+        </p:spPr>
+      </p:pic>
     </p:spTree>
     <p:extLst>
       <p:ext uri="{BB962C8B-B14F-4D97-AF65-F5344CB8AC3E}">

</xml_diff>

<commit_message>
Final, approved update to the poster. Ready to submit
</commit_message>
<xml_diff>
--- a/Group49_Poster.pptx
+++ b/Group49_Poster.pptx
@@ -255,7 +255,7 @@
             <a:fld id="{9CF59EBC-EC05-6B4D-B166-DDFA6A1EDCB6}" type="datetimeFigureOut">
               <a:rPr lang="en-US" smtClean="0"/>
               <a:pPr/>
-              <a:t>4/29/2019</a:t>
+              <a:t>4/30/2019</a:t>
             </a:fld>
             <a:endParaRPr lang="en-US" dirty="0"/>
           </a:p>
@@ -1841,7 +1841,7 @@
         <p:spPr>
           <a:xfrm>
             <a:off x="1964268" y="14018159"/>
-            <a:ext cx="8158689" cy="6376169"/>
+            <a:ext cx="8158689" cy="4308872"/>
           </a:xfrm>
           <a:prstGeom prst="rect">
             <a:avLst/>
@@ -2022,7 +2022,7 @@
           <a:p>
             <a:pPr>
               <a:lnSpc>
-                <a:spcPct val="150000"/>
+                <a:spcPct val="100000"/>
               </a:lnSpc>
               <a:spcAft>
                 <a:spcPts val="2600"/>
@@ -3019,6 +3019,9 @@
           </a:lstStyle>
           <a:p>
             <a:pPr>
+              <a:lnSpc>
+                <a:spcPct val="100000"/>
+              </a:lnSpc>
               <a:spcAft>
                 <a:spcPts val="2600"/>
               </a:spcAft>
@@ -3059,6 +3062,9 @@
           </a:p>
           <a:p>
             <a:pPr>
+              <a:lnSpc>
+                <a:spcPct val="100000"/>
+              </a:lnSpc>
               <a:spcAft>
                 <a:spcPts val="2600"/>
               </a:spcAft>
@@ -3077,6 +3083,9 @@
           </a:p>
           <a:p>
             <a:pPr>
+              <a:lnSpc>
+                <a:spcPct val="100000"/>
+              </a:lnSpc>
               <a:spcAft>
                 <a:spcPts val="2600"/>
               </a:spcAft>
@@ -3095,6 +3104,9 @@
           </a:p>
           <a:p>
             <a:pPr>
+              <a:lnSpc>
+                <a:spcPct val="100000"/>
+              </a:lnSpc>
               <a:spcAft>
                 <a:spcPts val="2600"/>
               </a:spcAft>
@@ -3113,6 +3125,9 @@
           </a:p>
           <a:p>
             <a:pPr>
+              <a:lnSpc>
+                <a:spcPct val="100000"/>
+              </a:lnSpc>
               <a:spcAft>
                 <a:spcPts val="2600"/>
               </a:spcAft>
@@ -4051,8 +4066,8 @@
         </p:nvSpPr>
         <p:spPr>
           <a:xfrm>
-            <a:off x="11675303" y="28779913"/>
-            <a:ext cx="9583982" cy="1692771"/>
+            <a:off x="11675303" y="29157229"/>
+            <a:ext cx="9583982" cy="2554545"/>
           </a:xfrm>
           <a:prstGeom prst="rect">
             <a:avLst/>
@@ -4073,7 +4088,7 @@
                 </a:solidFill>
                 <a:latin typeface="Verdana Regular" charset="0"/>
               </a:rPr>
-              <a:t>Tranquility Base</a:t>
+              <a:t>Lunar Module – “Eagle”</a:t>
             </a:r>
             <a:endParaRPr lang="en-US" sz="2800" dirty="0">
               <a:latin typeface="Verdana Regular"/>
@@ -4084,7 +4099,7 @@
               <a:rPr lang="en-US" sz="2800" dirty="0">
                 <a:latin typeface="Verdana Regular"/>
               </a:rPr>
-              <a:t>Many different objects used from many different sources. Accurate scaling and positioning was key.</a:t>
+              <a:t>While we found the object for the Lunar Module, the textures had to be manually applied. Also, with many different objects used from many different sources, accurate scaling and positioning was key.</a:t>
             </a:r>
           </a:p>
         </p:txBody>
@@ -4158,7 +4173,7 @@
         </p:nvSpPr>
         <p:spPr>
           <a:xfrm>
-            <a:off x="1931988" y="20879871"/>
+            <a:off x="1964268" y="19169114"/>
             <a:ext cx="8158690" cy="677108"/>
           </a:xfrm>
           <a:prstGeom prst="rect">
@@ -4362,8 +4377,8 @@
         </p:nvSpPr>
         <p:spPr>
           <a:xfrm>
-            <a:off x="1964267" y="22042522"/>
-            <a:ext cx="8126412" cy="4453848"/>
+            <a:off x="1923079" y="20434687"/>
+            <a:ext cx="8126412" cy="5659306"/>
           </a:xfrm>
           <a:prstGeom prst="rect">
             <a:avLst/>
@@ -4596,6 +4611,24 @@
                 <a:cs typeface="Verdana" charset="0"/>
               </a:rPr>
               <a:t>Provide historical about the mission context through historic video/audio</a:t>
+            </a:r>
+          </a:p>
+          <a:p>
+            <a:pPr>
+              <a:spcAft>
+                <a:spcPts val="2600"/>
+              </a:spcAft>
+            </a:pPr>
+            <a:r>
+              <a:rPr lang="en-US" dirty="0">
+                <a:solidFill>
+                  <a:schemeClr val="bg1"/>
+                </a:solidFill>
+                <a:latin typeface="Verdana" charset="0"/>
+                <a:ea typeface="Verdana" charset="0"/>
+                <a:cs typeface="Verdana" charset="0"/>
+              </a:rPr>
+              <a:t>Illustrate how large of an undertaking the Apollo 11 was, especially for its time</a:t>
             </a:r>
           </a:p>
           <a:p>
@@ -4833,7 +4866,7 @@
         </p:nvSpPr>
         <p:spPr>
           <a:xfrm flipH="1">
-            <a:off x="22469424" y="28708629"/>
+            <a:off x="22442452" y="29157229"/>
             <a:ext cx="9615907" cy="2123658"/>
           </a:xfrm>
           <a:prstGeom prst="rect">
@@ -5012,7 +5045,7 @@
         </p:blipFill>
         <p:spPr>
           <a:xfrm>
-            <a:off x="22167537" y="21141458"/>
+            <a:off x="22064111" y="20886461"/>
             <a:ext cx="10165739" cy="6817045"/>
           </a:xfrm>
           <a:prstGeom prst="rect">
@@ -5052,10 +5085,10 @@
       </p:pic>
       <p:pic>
         <p:nvPicPr>
-          <p:cNvPr id="30" name="Picture 29">
+          <p:cNvPr id="5" name="Picture 4">
             <a:extLst>
               <a:ext uri="{FF2B5EF4-FFF2-40B4-BE49-F238E27FC236}">
-                <a16:creationId xmlns:a16="http://schemas.microsoft.com/office/drawing/2014/main" id="{B51EAF4F-5353-4FAF-A75E-56AEEF93A11B}"/>
+                <a16:creationId xmlns:a16="http://schemas.microsoft.com/office/drawing/2014/main" id="{893353CC-50D4-408E-8A6F-152D56055A8B}"/>
               </a:ext>
             </a:extLst>
           </p:cNvPr>
@@ -5066,13 +5099,13 @@
         </p:nvPicPr>
         <p:blipFill rotWithShape="1">
           <a:blip r:embed="rId5"/>
-          <a:srcRect t="6721" r="2924" b="2654"/>
+          <a:srcRect l="20495" t="2748" r="19512" b="3511"/>
           <a:stretch/>
         </p:blipFill>
         <p:spPr>
           <a:xfrm>
-            <a:off x="11381338" y="21141459"/>
-            <a:ext cx="10117968" cy="6817044"/>
+            <a:off x="12871500" y="20236938"/>
+            <a:ext cx="7191587" cy="8116092"/>
           </a:xfrm>
           <a:prstGeom prst="rect">
             <a:avLst/>

</xml_diff>